<commit_message>
Merged Code - 04/15
</commit_message>
<xml_diff>
--- a/StoreAssist.pptx
+++ b/StoreAssist.pptx
@@ -449,7 +449,7 @@
             <a:fld id="{B61BEF0D-F0BB-DE4B-95CE-6DB70DBA9567}" type="datetimeFigureOut">
               <a:rPr lang="en-US" dirty="0"/>
               <a:pPr/>
-              <a:t>3/20/2020</a:t>
+              <a:t>4/6/2020</a:t>
             </a:fld>
             <a:endParaRPr lang="en-US" dirty="0"/>
           </a:p>
@@ -770,7 +770,7 @@
             <a:fld id="{B61BEF0D-F0BB-DE4B-95CE-6DB70DBA9567}" type="datetimeFigureOut">
               <a:rPr lang="en-US" dirty="0"/>
               <a:pPr/>
-              <a:t>3/20/2020</a:t>
+              <a:t>4/6/2020</a:t>
             </a:fld>
             <a:endParaRPr lang="en-US" dirty="0"/>
           </a:p>
@@ -1015,7 +1015,7 @@
             <a:fld id="{B61BEF0D-F0BB-DE4B-95CE-6DB70DBA9567}" type="datetimeFigureOut">
               <a:rPr lang="en-US" dirty="0"/>
               <a:pPr/>
-              <a:t>3/20/2020</a:t>
+              <a:t>4/6/2020</a:t>
             </a:fld>
             <a:endParaRPr lang="en-US" dirty="0"/>
           </a:p>
@@ -1351,7 +1351,7 @@
             <a:fld id="{B61BEF0D-F0BB-DE4B-95CE-6DB70DBA9567}" type="datetimeFigureOut">
               <a:rPr lang="en-US" dirty="0"/>
               <a:pPr/>
-              <a:t>3/20/2020</a:t>
+              <a:t>4/6/2020</a:t>
             </a:fld>
             <a:endParaRPr lang="en-US" dirty="0"/>
           </a:p>
@@ -1695,7 +1695,7 @@
             <a:fld id="{B61BEF0D-F0BB-DE4B-95CE-6DB70DBA9567}" type="datetimeFigureOut">
               <a:rPr lang="en-US" dirty="0"/>
               <a:pPr/>
-              <a:t>3/20/2020</a:t>
+              <a:t>4/6/2020</a:t>
             </a:fld>
             <a:endParaRPr lang="en-US" dirty="0"/>
           </a:p>
@@ -2066,7 +2066,7 @@
             <a:fld id="{B61BEF0D-F0BB-DE4B-95CE-6DB70DBA9567}" type="datetimeFigureOut">
               <a:rPr lang="en-US" dirty="0"/>
               <a:pPr/>
-              <a:t>3/20/2020</a:t>
+              <a:t>4/6/2020</a:t>
             </a:fld>
             <a:endParaRPr lang="en-US" dirty="0"/>
           </a:p>
@@ -2533,7 +2533,7 @@
             <a:fld id="{B61BEF0D-F0BB-DE4B-95CE-6DB70DBA9567}" type="datetimeFigureOut">
               <a:rPr lang="en-US" dirty="0"/>
               <a:pPr/>
-              <a:t>3/20/2020</a:t>
+              <a:t>4/6/2020</a:t>
             </a:fld>
             <a:endParaRPr lang="en-US" dirty="0"/>
           </a:p>
@@ -2735,7 +2735,7 @@
             <a:fld id="{B61BEF0D-F0BB-DE4B-95CE-6DB70DBA9567}" type="datetimeFigureOut">
               <a:rPr lang="en-US" dirty="0"/>
               <a:pPr/>
-              <a:t>3/20/2020</a:t>
+              <a:t>4/6/2020</a:t>
             </a:fld>
             <a:endParaRPr lang="en-US" dirty="0"/>
           </a:p>
@@ -2943,7 +2943,7 @@
             <a:fld id="{B61BEF0D-F0BB-DE4B-95CE-6DB70DBA9567}" type="datetimeFigureOut">
               <a:rPr lang="en-US" dirty="0"/>
               <a:pPr/>
-              <a:t>3/20/2020</a:t>
+              <a:t>4/6/2020</a:t>
             </a:fld>
             <a:endParaRPr lang="en-US" dirty="0"/>
           </a:p>
@@ -3171,7 +3171,7 @@
           <a:p>
             <a:fld id="{05BFA754-D5C3-4E66-96A6-867B257F58DC}" type="datetimeFigureOut">
               <a:rPr lang="en-US" dirty="0"/>
-              <a:t>3/20/2020</a:t>
+              <a:t>4/6/2020</a:t>
             </a:fld>
             <a:endParaRPr lang="en-US" dirty="0"/>
           </a:p>
@@ -3415,7 +3415,7 @@
             <a:fld id="{B61BEF0D-F0BB-DE4B-95CE-6DB70DBA9567}" type="datetimeFigureOut">
               <a:rPr lang="en-US" dirty="0"/>
               <a:pPr/>
-              <a:t>3/20/2020</a:t>
+              <a:t>4/6/2020</a:t>
             </a:fld>
             <a:endParaRPr lang="en-US" dirty="0"/>
           </a:p>
@@ -3678,7 +3678,7 @@
           <a:p>
             <a:fld id="{05BFA754-D5C3-4E66-96A6-867B257F58DC}" type="datetimeFigureOut">
               <a:rPr lang="en-US" dirty="0"/>
-              <a:t>3/20/2020</a:t>
+              <a:t>4/6/2020</a:t>
             </a:fld>
             <a:endParaRPr lang="en-US" dirty="0"/>
           </a:p>
@@ -4087,7 +4087,7 @@
             <a:fld id="{B61BEF0D-F0BB-DE4B-95CE-6DB70DBA9567}" type="datetimeFigureOut">
               <a:rPr lang="en-US" dirty="0"/>
               <a:pPr/>
-              <a:t>3/20/2020</a:t>
+              <a:t>4/6/2020</a:t>
             </a:fld>
             <a:endParaRPr lang="en-US" dirty="0"/>
           </a:p>
@@ -4233,7 +4233,7 @@
             <a:fld id="{B61BEF0D-F0BB-DE4B-95CE-6DB70DBA9567}" type="datetimeFigureOut">
               <a:rPr lang="en-US" dirty="0"/>
               <a:pPr/>
-              <a:t>3/20/2020</a:t>
+              <a:t>4/6/2020</a:t>
             </a:fld>
             <a:endParaRPr lang="en-US" dirty="0"/>
           </a:p>
@@ -4356,7 +4356,7 @@
             <a:fld id="{B61BEF0D-F0BB-DE4B-95CE-6DB70DBA9567}" type="datetimeFigureOut">
               <a:rPr lang="en-US" dirty="0"/>
               <a:pPr/>
-              <a:t>3/20/2020</a:t>
+              <a:t>4/6/2020</a:t>
             </a:fld>
             <a:endParaRPr lang="en-US" dirty="0"/>
           </a:p>
@@ -4608,7 +4608,7 @@
             <a:fld id="{B61BEF0D-F0BB-DE4B-95CE-6DB70DBA9567}" type="datetimeFigureOut">
               <a:rPr lang="en-US" dirty="0"/>
               <a:pPr/>
-              <a:t>3/20/2020</a:t>
+              <a:t>4/6/2020</a:t>
             </a:fld>
             <a:endParaRPr lang="en-US" dirty="0"/>
           </a:p>
@@ -4920,7 +4920,7 @@
             <a:fld id="{B61BEF0D-F0BB-DE4B-95CE-6DB70DBA9567}" type="datetimeFigureOut">
               <a:rPr lang="en-US" dirty="0"/>
               <a:pPr/>
-              <a:t>3/20/2020</a:t>
+              <a:t>4/6/2020</a:t>
             </a:fld>
             <a:endParaRPr lang="en-US" dirty="0"/>
           </a:p>
@@ -5268,7 +5268,7 @@
             <a:fld id="{B61BEF0D-F0BB-DE4B-95CE-6DB70DBA9567}" type="datetimeFigureOut">
               <a:rPr lang="en-US" dirty="0"/>
               <a:pPr/>
-              <a:t>3/20/2020</a:t>
+              <a:t>4/6/2020</a:t>
             </a:fld>
             <a:endParaRPr lang="en-US" dirty="0"/>
           </a:p>
@@ -5871,13 +5871,8 @@
             <a:pPr algn="r"/>
             <a:r>
               <a:rPr lang="en-US" sz="1400" b="1" u="sng" dirty="0"/>
-              <a:t>Team Name: </a:t>
-            </a:r>
-            <a:r>
-              <a:rPr lang="en-US" sz="1400" b="1" u="sng" dirty="0" err="1"/>
-              <a:t>TeamSaaS</a:t>
-            </a:r>
-            <a:endParaRPr lang="en-US" sz="1400" b="1" u="sng" dirty="0"/>
+              <a:t>Team Name: Team SaaS</a:t>
+            </a:r>
           </a:p>
           <a:p>
             <a:pPr algn="r"/>
@@ -5897,26 +5892,14 @@
             <a:pPr algn="r"/>
             <a:r>
               <a:rPr lang="en-US" sz="1400" b="1" dirty="0"/>
-              <a:t>Manasi </a:t>
-            </a:r>
-            <a:r>
-              <a:rPr lang="en-US" sz="1400" b="1" dirty="0" err="1"/>
-              <a:t>Sadanand</a:t>
-            </a:r>
+              <a:t>Manasi Sadanand Pai</a:t>
+            </a:r>
+          </a:p>
+          <a:p>
+            <a:pPr algn="r"/>
             <a:r>
               <a:rPr lang="en-US" sz="1400" b="1" dirty="0"/>
-              <a:t> Pai</a:t>
-            </a:r>
-          </a:p>
-          <a:p>
-            <a:pPr algn="r"/>
-            <a:r>
-              <a:rPr lang="en-US" sz="1400" b="1" dirty="0" err="1"/>
-              <a:t>Prarthana</a:t>
-            </a:r>
-            <a:r>
-              <a:rPr lang="en-US" sz="1400" b="1" dirty="0"/>
-              <a:t> Hemanth</a:t>
+              <a:t>Prarthana Hemanth</a:t>
             </a:r>
           </a:p>
         </p:txBody>

</xml_diff>